<commit_message>
updated systems schematic diagrams
</commit_message>
<xml_diff>
--- a/assets/images/citylearn_systems.pptx
+++ b/assets/images/citylearn_systems.pptx
@@ -258,7 +258,7 @@
           <a:p>
             <a:fld id="{C375809C-1078-40E5-8D78-A06230988E2D}" type="datetimeFigureOut">
               <a:rPr lang="en-US" smtClean="0"/>
-              <a:t>9/13/23</a:t>
+              <a:t>9/17/23</a:t>
             </a:fld>
             <a:endParaRPr lang="en-US"/>
           </a:p>
@@ -436,7 +436,7 @@
             <a:fld id="{2B843C7C-BC90-49F1-B4F6-A48532280559}" type="datetimeFigureOut">
               <a:rPr lang="de-DE" smtClean="0"/>
               <a:pPr/>
-              <a:t>13.09.23</a:t>
+              <a:t>16.09.23</a:t>
             </a:fld>
             <a:endParaRPr lang="de-DE"/>
           </a:p>

</xml_diff>